<commit_message>
mala promjena u tekstu uvoda
</commit_message>
<xml_diff>
--- a/prezentacija.pptx
+++ b/prezentacija.pptx
@@ -4896,6 +4896,13 @@
   <p:clrMapOvr>
     <a:masterClrMapping/>
   </p:clrMapOvr>
+  <p:timing>
+    <p:tnLst>
+      <p:par>
+        <p:cTn id="1" dur="indefinite" restart="never" nodeType="tmRoot"/>
+      </p:par>
+    </p:tnLst>
+  </p:timing>
 </p:sld>
 </file>
 
@@ -5185,7 +5192,6 @@
               <a:rPr lang="en-GB" dirty="0" smtClean="0"/>
               <a:t>)</a:t>
             </a:r>
-            <a:endParaRPr lang="en-GB" dirty="0" smtClean="0"/>
           </a:p>
           <a:p>
             <a:endParaRPr lang="hr-HR" dirty="0"/>
@@ -5322,6 +5328,13 @@
   <p:clrMapOvr>
     <a:masterClrMapping/>
   </p:clrMapOvr>
+  <p:timing>
+    <p:tnLst>
+      <p:par>
+        <p:cTn id="1" dur="indefinite" restart="never" nodeType="tmRoot"/>
+      </p:par>
+    </p:tnLst>
+  </p:timing>
 </p:sld>
 </file>
 
@@ -5736,6 +5749,13 @@
   <p:clrMapOvr>
     <a:masterClrMapping/>
   </p:clrMapOvr>
+  <p:timing>
+    <p:tnLst>
+      <p:par>
+        <p:cTn id="1" dur="indefinite" restart="never" nodeType="tmRoot"/>
+      </p:par>
+    </p:tnLst>
+  </p:timing>
 </p:sld>
 </file>
 
@@ -6940,6 +6960,13 @@
   <p:clrMapOvr>
     <a:masterClrMapping/>
   </p:clrMapOvr>
+  <p:timing>
+    <p:tnLst>
+      <p:par>
+        <p:cTn id="1" dur="indefinite" restart="never" nodeType="tmRoot"/>
+      </p:par>
+    </p:tnLst>
+  </p:timing>
 </p:sld>
 </file>
 
@@ -7116,6 +7143,13 @@
   <p:clrMapOvr>
     <a:masterClrMapping/>
   </p:clrMapOvr>
+  <p:timing>
+    <p:tnLst>
+      <p:par>
+        <p:cTn id="1" dur="indefinite" restart="never" nodeType="tmRoot"/>
+      </p:par>
+    </p:tnLst>
+  </p:timing>
 </p:sld>
 </file>
 
@@ -7292,6 +7326,13 @@
   <p:clrMapOvr>
     <a:masterClrMapping/>
   </p:clrMapOvr>
+  <p:timing>
+    <p:tnLst>
+      <p:par>
+        <p:cTn id="1" dur="indefinite" restart="never" nodeType="tmRoot"/>
+      </p:par>
+    </p:tnLst>
+  </p:timing>
 </p:sld>
 </file>
 
@@ -7468,6 +7509,13 @@
   <p:clrMapOvr>
     <a:masterClrMapping/>
   </p:clrMapOvr>
+  <p:timing>
+    <p:tnLst>
+      <p:par>
+        <p:cTn id="1" dur="indefinite" restart="never" nodeType="tmRoot"/>
+      </p:par>
+    </p:tnLst>
+  </p:timing>
 </p:sld>
 </file>
 
@@ -7723,6 +7771,13 @@
   <p:clrMapOvr>
     <a:masterClrMapping/>
   </p:clrMapOvr>
+  <p:timing>
+    <p:tnLst>
+      <p:par>
+        <p:cTn id="1" dur="indefinite" restart="never" nodeType="tmRoot"/>
+      </p:par>
+    </p:tnLst>
+  </p:timing>
 </p:sld>
 </file>
 
@@ -7817,16 +7872,22 @@
           </a:p>
           <a:p>
             <a:r>
-              <a:rPr lang="en-GB" dirty="0">
-                <a:hlinkClick r:id="rId3"/>
-              </a:rPr>
-              <a:t>r</a:t>
-            </a:r>
-            <a:r>
               <a:rPr lang="en-GB" dirty="0" smtClean="0">
                 <a:hlinkClick r:id="rId3"/>
               </a:rPr>
-              <a:t>ea.Pintar@fer.hr</a:t>
+              <a:t>rea.</a:t>
+            </a:r>
+            <a:r>
+              <a:rPr lang="hr-HR" smtClean="0">
+                <a:hlinkClick r:id="rId3"/>
+              </a:rPr>
+              <a:t>p</a:t>
+            </a:r>
+            <a:r>
+              <a:rPr lang="en-GB" smtClean="0">
+                <a:hlinkClick r:id="rId3"/>
+              </a:rPr>
+              <a:t>intar@fer.hr</a:t>
             </a:r>
             <a:endParaRPr lang="en-GB" dirty="0" smtClean="0"/>
           </a:p>
@@ -7984,6 +8045,13 @@
   <p:clrMapOvr>
     <a:masterClrMapping/>
   </p:clrMapOvr>
+  <p:timing>
+    <p:tnLst>
+      <p:par>
+        <p:cTn id="1" dur="indefinite" restart="never" nodeType="tmRoot"/>
+      </p:par>
+    </p:tnLst>
+  </p:timing>
 </p:sld>
 </file>
 

</xml_diff>